<commit_message>
moved figure out of the way
</commit_message>
<xml_diff>
--- a/format-encodings/documents/ARCHIVE/introduction-to-encodings.pptx
+++ b/format-encodings/documents/ARCHIVE/introduction-to-encodings.pptx
@@ -21660,7 +21660,7 @@
         </p:nvSpPr>
         <p:spPr>
           <a:xfrm>
-            <a:off x="6183418" y="1524775"/>
+            <a:off x="6224239" y="1489791"/>
             <a:ext cx="2847900" cy="1436100"/>
           </a:xfrm>
           <a:prstGeom prst="rect">
@@ -23268,16 +23268,7 @@
                 </a:solidFill>
                 <a:hlinkClick r:id="rId3"/>
               </a:rPr>
-              <a:t>UTF-8 </a:t>
-            </a:r>
-            <a:r>
-              <a:rPr lang="en" u="sng">
-                <a:solidFill>
-                  <a:schemeClr val="hlink"/>
-                </a:solidFill>
-                <a:hlinkClick r:id="rId3"/>
-              </a:rPr>
-              <a:t>characters</a:t>
+              <a:t>UTF-8 characters</a:t>
             </a:r>
             <a:r>
               <a:rPr lang="en"/>
@@ -23410,7 +23401,7 @@
           <a:p>
             <a:r>
               <a:rPr lang="en-US" dirty="0"/>
-              <a:t>Cesare Cipher</a:t>
+              <a:t>Caesar Cipher</a:t>
             </a:r>
           </a:p>
         </p:txBody>

</xml_diff>

<commit_message>
updates from the last class
</commit_message>
<xml_diff>
--- a/format-encodings/documents/ARCHIVE/introduction-to-encodings.pptx
+++ b/format-encodings/documents/ARCHIVE/introduction-to-encodings.pptx
@@ -1180,7 +1180,7 @@
         </p:nvSpPr>
         <p:spPr>
           <a:xfrm>
-            <a:off x="381300" y="685800"/>
+            <a:off x="381000" y="685800"/>
             <a:ext cx="6096000" cy="3429000"/>
           </a:xfrm>
           <a:custGeom>
@@ -7844,8 +7844,8 @@
         </p:blipFill>
         <p:spPr>
           <a:xfrm>
-            <a:off x="5127171" y="3299382"/>
-            <a:ext cx="2454728" cy="1663144"/>
+            <a:off x="5453743" y="3520643"/>
+            <a:ext cx="2128156" cy="1441883"/>
           </a:xfrm>
           <a:prstGeom prst="rect">
             <a:avLst/>
@@ -14588,7 +14588,7 @@
         </p:nvSpPr>
         <p:spPr>
           <a:xfrm rot="-5400000">
-            <a:off x="7501025" y="2919100"/>
+            <a:off x="7811400" y="2827229"/>
             <a:ext cx="2364900" cy="323100"/>
           </a:xfrm>
           <a:prstGeom prst="rect">
@@ -21334,7 +21334,7 @@
         </p:spPr>
         <p:txBody>
           <a:bodyPr spcFirstLastPara="1" wrap="square" lIns="91425" tIns="91425" rIns="91425" bIns="91425" anchor="t" anchorCtr="0">
-            <a:normAutofit fontScale="92500"/>
+            <a:normAutofit fontScale="92500" lnSpcReduction="10000"/>
           </a:bodyPr>
           <a:lstStyle/>
           <a:p>
@@ -21349,19 +21349,19 @@
               <a:buChar char="●"/>
             </a:pPr>
             <a:r>
-              <a:rPr lang="en"/>
+              <a:rPr lang="en" dirty="0"/>
               <a:t>(6 bits) The </a:t>
             </a:r>
             <a:r>
-              <a:rPr lang="en" b="1" u="sng"/>
+              <a:rPr lang="en" b="1" u="sng" dirty="0"/>
               <a:t>op</a:t>
             </a:r>
             <a:r>
-              <a:rPr lang="en"/>
+              <a:rPr lang="en" dirty="0"/>
               <a:t>eration to be performed  (</a:t>
             </a:r>
             <a:r>
-              <a:rPr lang="en" u="sng">
+              <a:rPr lang="en" u="sng" dirty="0">
                 <a:solidFill>
                   <a:schemeClr val="hlink"/>
                 </a:solidFill>
@@ -21370,10 +21370,10 @@
               <a:t>MIPS Encoding</a:t>
             </a:r>
             <a:r>
-              <a:rPr lang="en"/>
+              <a:rPr lang="en" dirty="0"/>
               <a:t>)</a:t>
             </a:r>
-            <a:endParaRPr/>
+            <a:endParaRPr dirty="0"/>
           </a:p>
           <a:p>
             <a:pPr marL="914400" lvl="1" indent="-317500" algn="l" rtl="0">
@@ -21387,10 +21387,10 @@
               <a:buChar char="○"/>
             </a:pPr>
             <a:r>
-              <a:rPr lang="en"/>
+              <a:rPr lang="en" dirty="0"/>
               <a:t>It also indicates the encoding format to be used!</a:t>
             </a:r>
-            <a:endParaRPr/>
+            <a:endParaRPr dirty="0"/>
           </a:p>
           <a:p>
             <a:pPr marL="914400" lvl="1" indent="-317500" algn="l" rtl="0">
@@ -21404,10 +21404,10 @@
               <a:buChar char="○"/>
             </a:pPr>
             <a:r>
-              <a:rPr lang="en"/>
+              <a:rPr lang="en" dirty="0"/>
               <a:t>There are three primary formats:  R, I, and J.</a:t>
             </a:r>
-            <a:endParaRPr/>
+            <a:endParaRPr dirty="0"/>
           </a:p>
           <a:p>
             <a:pPr marL="457200" lvl="0" indent="0" algn="l" rtl="0">
@@ -21419,7 +21419,7 @@
               </a:spcAft>
               <a:buNone/>
             </a:pPr>
-            <a:endParaRPr/>
+            <a:endParaRPr dirty="0"/>
           </a:p>
           <a:p>
             <a:pPr marL="457200" lvl="0" indent="-342900" algn="l" rtl="0">
@@ -21433,10 +21433,10 @@
               <a:buChar char="●"/>
             </a:pPr>
             <a:r>
-              <a:rPr lang="en"/>
+              <a:rPr lang="en" dirty="0"/>
               <a:t>Other fields determine</a:t>
             </a:r>
-            <a:endParaRPr/>
+            <a:endParaRPr dirty="0"/>
           </a:p>
           <a:p>
             <a:pPr marL="914400" lvl="1" indent="-317500" algn="l" rtl="0">
@@ -21450,11 +21450,11 @@
               <a:buChar char="○"/>
             </a:pPr>
             <a:r>
-              <a:rPr lang="en"/>
+              <a:rPr lang="en" dirty="0"/>
               <a:t>(5 bits) which registers are used (</a:t>
             </a:r>
             <a:r>
-              <a:rPr lang="en" u="sng">
+              <a:rPr lang="en" u="sng" dirty="0">
                 <a:solidFill>
                   <a:schemeClr val="hlink"/>
                 </a:solidFill>
@@ -21463,10 +21463,10 @@
               <a:t>Register Encoding</a:t>
             </a:r>
             <a:r>
-              <a:rPr lang="en"/>
+              <a:rPr lang="en" dirty="0"/>
               <a:t>)</a:t>
             </a:r>
-            <a:endParaRPr/>
+            <a:endParaRPr dirty="0"/>
           </a:p>
           <a:p>
             <a:pPr marL="1371600" lvl="2" indent="-317500" algn="l" rtl="0">
@@ -21480,14 +21480,14 @@
               <a:buChar char="■"/>
             </a:pPr>
             <a:r>
-              <a:rPr lang="en" b="1" u="sng"/>
+              <a:rPr lang="en" b="1" u="sng" dirty="0" err="1"/>
               <a:t>rs</a:t>
             </a:r>
             <a:r>
-              <a:rPr lang="en"/>
+              <a:rPr lang="en" dirty="0"/>
               <a:t>: first source register </a:t>
             </a:r>
-            <a:endParaRPr/>
+            <a:endParaRPr dirty="0"/>
           </a:p>
           <a:p>
             <a:pPr marL="1371600" lvl="2" indent="-317500" algn="l" rtl="0">
@@ -21501,14 +21501,14 @@
               <a:buChar char="■"/>
             </a:pPr>
             <a:r>
-              <a:rPr lang="en" b="1" u="sng"/>
+              <a:rPr lang="en" b="1" u="sng" dirty="0"/>
               <a:t>rt</a:t>
             </a:r>
             <a:r>
-              <a:rPr lang="en"/>
+              <a:rPr lang="en" dirty="0"/>
               <a:t>: second register</a:t>
             </a:r>
-            <a:endParaRPr/>
+            <a:endParaRPr dirty="0"/>
           </a:p>
           <a:p>
             <a:pPr marL="1371600" lvl="2" indent="-317500" algn="l" rtl="0">
@@ -21522,14 +21522,14 @@
               <a:buChar char="■"/>
             </a:pPr>
             <a:r>
-              <a:rPr lang="en" b="1" u="sng"/>
+              <a:rPr lang="en" b="1" u="sng" dirty="0" err="1"/>
               <a:t>rd</a:t>
             </a:r>
             <a:r>
-              <a:rPr lang="en"/>
+              <a:rPr lang="en" dirty="0"/>
               <a:t>: destination register</a:t>
             </a:r>
-            <a:endParaRPr/>
+            <a:endParaRPr dirty="0"/>
           </a:p>
           <a:p>
             <a:pPr marL="914400" lvl="1" indent="-317500" algn="l" rtl="0">
@@ -21543,18 +21543,18 @@
               <a:buChar char="○"/>
             </a:pPr>
             <a:r>
-              <a:rPr lang="en"/>
+              <a:rPr lang="en" dirty="0"/>
               <a:t>(5 bits) the amount a value is </a:t>
             </a:r>
             <a:r>
-              <a:rPr lang="en" b="1" u="sng"/>
+              <a:rPr lang="en" b="1" u="sng" dirty="0"/>
               <a:t>sh</a:t>
             </a:r>
             <a:r>
-              <a:rPr lang="en"/>
+              <a:rPr lang="en" dirty="0"/>
               <a:t>ifted (range: 0 .. 31)</a:t>
             </a:r>
-            <a:endParaRPr/>
+            <a:endParaRPr dirty="0"/>
           </a:p>
           <a:p>
             <a:pPr marL="914400" lvl="1" indent="-317500" algn="l" rtl="0">
@@ -21568,19 +21568,19 @@
               <a:buChar char="○"/>
             </a:pPr>
             <a:r>
-              <a:rPr lang="en"/>
+              <a:rPr lang="en" dirty="0"/>
               <a:t>(6 bits) the mathematical </a:t>
             </a:r>
             <a:r>
-              <a:rPr lang="en" b="1" u="sng"/>
+              <a:rPr lang="en" b="1" u="sng" dirty="0"/>
               <a:t>func</a:t>
             </a:r>
             <a:r>
-              <a:rPr lang="en"/>
+              <a:rPr lang="en" dirty="0"/>
               <a:t>tion to be performed (</a:t>
             </a:r>
             <a:r>
-              <a:rPr lang="en" u="sng">
+              <a:rPr lang="en" u="sng" dirty="0">
                 <a:solidFill>
                   <a:schemeClr val="accent5"/>
                 </a:solidFill>
@@ -21595,10 +21595,10 @@
               <a:t>MIPS Encoding</a:t>
             </a:r>
             <a:r>
-              <a:rPr lang="en"/>
+              <a:rPr lang="en" dirty="0"/>
               <a:t>)</a:t>
             </a:r>
-            <a:endParaRPr/>
+            <a:endParaRPr dirty="0"/>
           </a:p>
           <a:p>
             <a:pPr marL="914400" lvl="1" indent="-317500" algn="l" rtl="0">
@@ -21612,18 +21612,18 @@
               <a:buChar char="○"/>
             </a:pPr>
             <a:r>
-              <a:rPr lang="en"/>
+              <a:rPr lang="en" dirty="0"/>
               <a:t>(16 bits) the </a:t>
             </a:r>
             <a:r>
-              <a:rPr lang="en" b="1" u="sng"/>
+              <a:rPr lang="en" b="1" u="sng" dirty="0"/>
               <a:t>imm</a:t>
             </a:r>
             <a:r>
-              <a:rPr lang="en"/>
+              <a:rPr lang="en" dirty="0"/>
               <a:t>ediate value (range: -2048 .. 2047)</a:t>
             </a:r>
-            <a:endParaRPr/>
+            <a:endParaRPr dirty="0"/>
           </a:p>
           <a:p>
             <a:pPr marL="914400" lvl="1" indent="-317500" algn="l" rtl="0">
@@ -21637,18 +21637,18 @@
               <a:buChar char="○"/>
             </a:pPr>
             <a:r>
-              <a:rPr lang="en"/>
+              <a:rPr lang="en" dirty="0"/>
               <a:t>(26 bits) the </a:t>
             </a:r>
             <a:r>
-              <a:rPr lang="en" b="1" u="sng"/>
+              <a:rPr lang="en" b="1" u="sng" dirty="0"/>
               <a:t>addr</a:t>
             </a:r>
             <a:r>
-              <a:rPr lang="en"/>
+              <a:rPr lang="en" dirty="0"/>
               <a:t>ess / 4 </a:t>
             </a:r>
-            <a:endParaRPr/>
+            <a:endParaRPr dirty="0"/>
           </a:p>
         </p:txBody>
       </p:sp>
@@ -21660,7 +21660,7 @@
         </p:nvSpPr>
         <p:spPr>
           <a:xfrm>
-            <a:off x="6224239" y="1489791"/>
+            <a:off x="6296100" y="4038013"/>
             <a:ext cx="2847900" cy="1436100"/>
           </a:xfrm>
           <a:prstGeom prst="rect">
@@ -21694,7 +21694,7 @@
               </a:spcAft>
               <a:buNone/>
             </a:pPr>
-            <a:endParaRPr/>
+            <a:endParaRPr dirty="0"/>
           </a:p>
         </p:txBody>
       </p:sp>
@@ -21885,10 +21885,10 @@
               <a:buChar char="●"/>
             </a:pPr>
             <a:r>
-              <a:rPr lang="en" sz="1700"/>
+              <a:rPr lang="en" sz="1700" dirty="0"/>
               <a:t>Three primary instruction encodings include:</a:t>
             </a:r>
-            <a:endParaRPr sz="1700"/>
+            <a:endParaRPr sz="1700" dirty="0"/>
           </a:p>
           <a:p>
             <a:pPr marL="914400" lvl="1" indent="-311150" algn="l" rtl="0">
@@ -21902,10 +21902,10 @@
               <a:buChar char="○"/>
             </a:pPr>
             <a:r>
-              <a:rPr lang="en" sz="1300"/>
+              <a:rPr lang="en" sz="1300" dirty="0"/>
               <a:t>R-type (register)</a:t>
             </a:r>
-            <a:endParaRPr sz="1300"/>
+            <a:endParaRPr sz="1300" dirty="0"/>
           </a:p>
           <a:p>
             <a:pPr marL="1371600" lvl="2" indent="-311150" algn="l" rtl="0">
@@ -21919,10 +21919,10 @@
               <a:buChar char="■"/>
             </a:pPr>
             <a:r>
-              <a:rPr lang="en" sz="1300"/>
+              <a:rPr lang="en" sz="1300" dirty="0"/>
               <a:t>for instructions using only registers</a:t>
             </a:r>
-            <a:endParaRPr sz="1300"/>
+            <a:endParaRPr sz="1300" dirty="0"/>
           </a:p>
           <a:p>
             <a:pPr marL="1371600" lvl="2" indent="-311150" algn="l" rtl="0">
@@ -21936,10 +21936,10 @@
               <a:buChar char="■"/>
             </a:pPr>
             <a:r>
-              <a:rPr lang="en" sz="1300"/>
+              <a:rPr lang="en" sz="1300" dirty="0"/>
               <a:t>example: 0x014b4020		(2# 0000 0001 0100 1011 0100 0000 0010 0000)</a:t>
             </a:r>
-            <a:endParaRPr sz="1300"/>
+            <a:endParaRPr sz="1300" dirty="0"/>
           </a:p>
           <a:p>
             <a:pPr marL="1371600" lvl="2" indent="-311150" algn="l" rtl="0">
@@ -21953,13 +21953,13 @@
               <a:buChar char="■"/>
             </a:pPr>
             <a:r>
-              <a:rPr lang="en" sz="1300"/>
+              <a:rPr lang="en" sz="1300" dirty="0"/>
               <a:t>for: add $t0, $t1, $t2   		($t0 = $t1 + $t2)</a:t>
             </a:r>
             <a:br>
-              <a:rPr lang="en" sz="1300"/>
+              <a:rPr lang="en" sz="1300" dirty="0"/>
             </a:br>
-            <a:endParaRPr sz="1300"/>
+            <a:endParaRPr sz="1300" dirty="0"/>
           </a:p>
           <a:p>
             <a:pPr marL="914400" lvl="1" indent="-311150" algn="l" rtl="0">
@@ -21973,10 +21973,10 @@
               <a:buChar char="○"/>
             </a:pPr>
             <a:r>
-              <a:rPr lang="en" sz="1300"/>
+              <a:rPr lang="en" sz="1300" dirty="0"/>
               <a:t>I-type (immediate)</a:t>
             </a:r>
-            <a:endParaRPr sz="1300"/>
+            <a:endParaRPr sz="1300" dirty="0"/>
           </a:p>
           <a:p>
             <a:pPr marL="1371600" lvl="2" indent="-311150" algn="l" rtl="0">
@@ -21990,10 +21990,10 @@
               <a:buChar char="■"/>
             </a:pPr>
             <a:r>
-              <a:rPr lang="en" sz="1300"/>
+              <a:rPr lang="en" sz="1300" dirty="0"/>
               <a:t>for instructions with immediate values: </a:t>
             </a:r>
-            <a:endParaRPr sz="1300"/>
+            <a:endParaRPr sz="1300" dirty="0"/>
           </a:p>
           <a:p>
             <a:pPr marL="1371600" lvl="2" indent="-311150" algn="l" rtl="0">
@@ -22007,10 +22007,10 @@
               <a:buChar char="■"/>
             </a:pPr>
             <a:r>
-              <a:rPr lang="en" sz="1300"/>
-              <a:t>example: 0x21280005 	         (2# ) </a:t>
+              <a:rPr lang="en" sz="1300" dirty="0"/>
+              <a:t>example: 0x21280005 	                    (2# 0010 0001 0010 1000 0000 0000 0000 0101) </a:t>
             </a:r>
-            <a:endParaRPr sz="1300"/>
+            <a:endParaRPr sz="1300" dirty="0"/>
           </a:p>
           <a:p>
             <a:pPr marL="1371600" lvl="2" indent="-311150" algn="l" rtl="0">
@@ -22024,13 +22024,21 @@
               <a:buChar char="■"/>
             </a:pPr>
             <a:r>
-              <a:rPr lang="en" sz="1300"/>
-              <a:t>for: addi $t0, $t1, 5 		($t0 = $t1 + 5)</a:t>
+              <a:rPr lang="en" sz="1300" dirty="0"/>
+              <a:t>for: </a:t>
+            </a:r>
+            <a:r>
+              <a:rPr lang="en" sz="1300" dirty="0" err="1"/>
+              <a:t>addi</a:t>
+            </a:r>
+            <a:r>
+              <a:rPr lang="en" sz="1300" dirty="0"/>
+              <a:t> $t0, $t1, 5 		($t0 = $t1 + 5)</a:t>
             </a:r>
             <a:br>
-              <a:rPr lang="en" sz="1300"/>
+              <a:rPr lang="en" sz="1300" dirty="0"/>
             </a:br>
-            <a:endParaRPr sz="1300"/>
+            <a:endParaRPr sz="1300" dirty="0"/>
           </a:p>
           <a:p>
             <a:pPr marL="914400" lvl="1" indent="-311150" algn="l" rtl="0">
@@ -22044,10 +22052,10 @@
               <a:buChar char="○"/>
             </a:pPr>
             <a:r>
-              <a:rPr lang="en" sz="1300"/>
+              <a:rPr lang="en" sz="1300" dirty="0"/>
               <a:t>J-type (jump)</a:t>
             </a:r>
-            <a:endParaRPr sz="1300"/>
+            <a:endParaRPr sz="1300" dirty="0"/>
           </a:p>
           <a:p>
             <a:pPr marL="1371600" lvl="2" indent="-311150" algn="l" rtl="0">
@@ -22061,10 +22069,10 @@
               <a:buChar char="■"/>
             </a:pPr>
             <a:r>
-              <a:rPr lang="en" sz="1300"/>
+              <a:rPr lang="en" sz="1300" dirty="0"/>
               <a:t>for instructions that perform unconditional jumps</a:t>
             </a:r>
-            <a:endParaRPr sz="1300"/>
+            <a:endParaRPr sz="1300" dirty="0"/>
           </a:p>
           <a:p>
             <a:pPr marL="1371600" lvl="2" indent="-311150" algn="l" rtl="0">
@@ -22078,10 +22086,10 @@
               <a:buChar char="■"/>
             </a:pPr>
             <a:r>
-              <a:rPr lang="en" sz="1300"/>
-              <a:t>example:  0x0810000		(2# )</a:t>
+              <a:rPr lang="en" sz="1300" dirty="0"/>
+              <a:t>example:  0x08100000		(2# 0000 1000 0001 0000 0000 0000 0000 0000)</a:t>
             </a:r>
-            <a:endParaRPr sz="1300"/>
+            <a:endParaRPr sz="1300" dirty="0"/>
           </a:p>
           <a:p>
             <a:pPr marL="1371600" lvl="2" indent="-311150" algn="l" rtl="0">
@@ -22095,10 +22103,18 @@
               <a:buChar char="■"/>
             </a:pPr>
             <a:r>
-              <a:rPr lang="en" sz="1300"/>
-              <a:t>for: j label 				# goto label = 0x00400000</a:t>
+              <a:rPr lang="en" sz="1300" dirty="0"/>
+              <a:t>for: j main 			(</a:t>
             </a:r>
-            <a:endParaRPr sz="1300"/>
+            <a:r>
+              <a:rPr lang="en" sz="1300" dirty="0" err="1"/>
+              <a:t>goto</a:t>
+            </a:r>
+            <a:r>
+              <a:rPr lang="en" sz="1300" dirty="0"/>
+              <a:t> main  # main == 0x00400000)</a:t>
+            </a:r>
+            <a:endParaRPr sz="1300" dirty="0"/>
           </a:p>
         </p:txBody>
       </p:sp>
@@ -29287,10 +29303,10 @@
                         <a:buNone/>
                       </a:pPr>
                       <a:r>
-                        <a:rPr lang="en" sz="1200"/>
+                        <a:rPr lang="en" sz="1200" dirty="0"/>
                         <a:t>? </a:t>
                       </a:r>
-                      <a:endParaRPr sz="1200"/>
+                      <a:endParaRPr sz="1200" dirty="0"/>
                     </a:p>
                   </a:txBody>
                   <a:tcPr marL="91425" marR="91425" marT="91425" marB="91425"/>
@@ -29398,18 +29414,18 @@
                         <a:buNone/>
                       </a:pPr>
                       <a:r>
-                        <a:rPr lang="en" sz="1200"/>
+                        <a:rPr lang="en" sz="1200" dirty="0"/>
                         <a:t>104   ? </a:t>
                       </a:r>
                       <a:r>
-                        <a:rPr lang="en" sz="1200">
+                        <a:rPr lang="en" sz="1200" dirty="0">
                           <a:highlight>
                             <a:schemeClr val="dk1"/>
                           </a:highlight>
                         </a:rPr>
                         <a:t>104</a:t>
                       </a:r>
-                      <a:endParaRPr sz="1200">
+                      <a:endParaRPr sz="1200" dirty="0">
                         <a:highlight>
                           <a:schemeClr val="dk1"/>
                         </a:highlight>
@@ -29478,7 +29494,7 @@
         </p:nvSpPr>
         <p:spPr>
           <a:xfrm>
-            <a:off x="5783375" y="2604825"/>
+            <a:off x="5132225" y="2192825"/>
             <a:ext cx="283800" cy="2770500"/>
           </a:xfrm>
           <a:prstGeom prst="rect">
@@ -29505,10 +29521,18 @@
               <a:buNone/>
             </a:pPr>
             <a:r>
-              <a:rPr lang="en"/>
-              <a:t>a b c d e f g h i j k l </a:t>
+              <a:rPr lang="en" dirty="0"/>
+              <a:t>a b c d e f g h </a:t>
             </a:r>
-            <a:endParaRPr/>
+            <a:r>
+              <a:rPr lang="en" dirty="0" err="1"/>
+              <a:t>i</a:t>
+            </a:r>
+            <a:r>
+              <a:rPr lang="en" dirty="0"/>
+              <a:t> j k l </a:t>
+            </a:r>
+            <a:endParaRPr dirty="0"/>
           </a:p>
         </p:txBody>
       </p:sp>

</xml_diff>